<commit_message>
Update Loss Prevention Device Code Flow.pptx
</commit_message>
<xml_diff>
--- a/Loss Prevention Device/Loss Prevention Device Code Flow.pptx
+++ b/Loss Prevention Device/Loss Prevention Device Code Flow.pptx
@@ -105,6 +105,11 @@
       </a:defRPr>
     </a:lvl9pPr>
   </p:defaultTextStyle>
+  <p:extLst>
+    <p:ext uri="{EFAFB233-063F-42B5-8137-9DF3F51BA10A}">
+      <p15:sldGuideLst xmlns:p15="http://schemas.microsoft.com/office/powerpoint/2012/main"/>
+    </p:ext>
+  </p:extLst>
 </p:presentation>
 </file>
 
@@ -255,7 +260,7 @@
           <a:p>
             <a:fld id="{5D32698B-3FD9-4A45-9B32-A01890A0600C}" type="datetimeFigureOut">
               <a:rPr lang="en-US" smtClean="0"/>
-              <a:t>11/2/2020</a:t>
+              <a:t>11/11/2020</a:t>
             </a:fld>
             <a:endParaRPr lang="en-US"/>
           </a:p>
@@ -453,7 +458,7 @@
           <a:p>
             <a:fld id="{5D32698B-3FD9-4A45-9B32-A01890A0600C}" type="datetimeFigureOut">
               <a:rPr lang="en-US" smtClean="0"/>
-              <a:t>11/2/2020</a:t>
+              <a:t>11/11/2020</a:t>
             </a:fld>
             <a:endParaRPr lang="en-US"/>
           </a:p>
@@ -661,7 +666,7 @@
           <a:p>
             <a:fld id="{5D32698B-3FD9-4A45-9B32-A01890A0600C}" type="datetimeFigureOut">
               <a:rPr lang="en-US" smtClean="0"/>
-              <a:t>11/2/2020</a:t>
+              <a:t>11/11/2020</a:t>
             </a:fld>
             <a:endParaRPr lang="en-US"/>
           </a:p>
@@ -859,7 +864,7 @@
           <a:p>
             <a:fld id="{5D32698B-3FD9-4A45-9B32-A01890A0600C}" type="datetimeFigureOut">
               <a:rPr lang="en-US" smtClean="0"/>
-              <a:t>11/2/2020</a:t>
+              <a:t>11/11/2020</a:t>
             </a:fld>
             <a:endParaRPr lang="en-US"/>
           </a:p>
@@ -1134,7 +1139,7 @@
           <a:p>
             <a:fld id="{5D32698B-3FD9-4A45-9B32-A01890A0600C}" type="datetimeFigureOut">
               <a:rPr lang="en-US" smtClean="0"/>
-              <a:t>11/2/2020</a:t>
+              <a:t>11/11/2020</a:t>
             </a:fld>
             <a:endParaRPr lang="en-US"/>
           </a:p>
@@ -1399,7 +1404,7 @@
           <a:p>
             <a:fld id="{5D32698B-3FD9-4A45-9B32-A01890A0600C}" type="datetimeFigureOut">
               <a:rPr lang="en-US" smtClean="0"/>
-              <a:t>11/2/2020</a:t>
+              <a:t>11/11/2020</a:t>
             </a:fld>
             <a:endParaRPr lang="en-US"/>
           </a:p>
@@ -1811,7 +1816,7 @@
           <a:p>
             <a:fld id="{5D32698B-3FD9-4A45-9B32-A01890A0600C}" type="datetimeFigureOut">
               <a:rPr lang="en-US" smtClean="0"/>
-              <a:t>11/2/2020</a:t>
+              <a:t>11/11/2020</a:t>
             </a:fld>
             <a:endParaRPr lang="en-US"/>
           </a:p>
@@ -1952,7 +1957,7 @@
           <a:p>
             <a:fld id="{5D32698B-3FD9-4A45-9B32-A01890A0600C}" type="datetimeFigureOut">
               <a:rPr lang="en-US" smtClean="0"/>
-              <a:t>11/2/2020</a:t>
+              <a:t>11/11/2020</a:t>
             </a:fld>
             <a:endParaRPr lang="en-US"/>
           </a:p>
@@ -2065,7 +2070,7 @@
           <a:p>
             <a:fld id="{5D32698B-3FD9-4A45-9B32-A01890A0600C}" type="datetimeFigureOut">
               <a:rPr lang="en-US" smtClean="0"/>
-              <a:t>11/2/2020</a:t>
+              <a:t>11/11/2020</a:t>
             </a:fld>
             <a:endParaRPr lang="en-US"/>
           </a:p>
@@ -2376,7 +2381,7 @@
           <a:p>
             <a:fld id="{5D32698B-3FD9-4A45-9B32-A01890A0600C}" type="datetimeFigureOut">
               <a:rPr lang="en-US" smtClean="0"/>
-              <a:t>11/2/2020</a:t>
+              <a:t>11/11/2020</a:t>
             </a:fld>
             <a:endParaRPr lang="en-US"/>
           </a:p>
@@ -2664,7 +2669,7 @@
           <a:p>
             <a:fld id="{5D32698B-3FD9-4A45-9B32-A01890A0600C}" type="datetimeFigureOut">
               <a:rPr lang="en-US" smtClean="0"/>
-              <a:t>11/2/2020</a:t>
+              <a:t>11/11/2020</a:t>
             </a:fld>
             <a:endParaRPr lang="en-US"/>
           </a:p>
@@ -2905,7 +2910,7 @@
           <a:p>
             <a:fld id="{5D32698B-3FD9-4A45-9B32-A01890A0600C}" type="datetimeFigureOut">
               <a:rPr lang="en-US" smtClean="0"/>
-              <a:t>11/2/2020</a:t>
+              <a:t>11/11/2020</a:t>
             </a:fld>
             <a:endParaRPr lang="en-US"/>
           </a:p>
@@ -3473,7 +3478,7 @@
             <a:pPr algn="ctr"/>
             <a:r>
               <a:rPr lang="en-US" dirty="0"/>
-              <a:t>Record Location, time, text phone</a:t>
+              <a:t>Record Location, text phone</a:t>
             </a:r>
           </a:p>
         </p:txBody>
@@ -3522,7 +3527,7 @@
             <a:pPr algn="ctr"/>
             <a:r>
               <a:rPr lang="en-US" dirty="0"/>
-              <a:t>Wait for phone to re-enter range</a:t>
+              <a:t>Wait for phone to re-enter range and connect</a:t>
             </a:r>
           </a:p>
         </p:txBody>

</xml_diff>